<commit_message>
updated binder link for intro slide
</commit_message>
<xml_diff>
--- a/Tankersley_INSTANT_2022_1min_intro.pptx
+++ b/Tankersley_INSTANT_2022_1min_intro.pptx
@@ -197,7 +197,7 @@
           <a:p>
             <a:fld id="{994930AC-0CAE-454E-82AE-CCEF7F275F04}" type="datetimeFigureOut">
               <a:rPr lang="en-NZ" smtClean="0"/>
-              <a:t>21/09/2022</a:t>
+              <a:t>26/09/2022</a:t>
             </a:fld>
             <a:endParaRPr lang="en-NZ"/>
           </a:p>
@@ -748,7 +748,7 @@
           <a:p>
             <a:fld id="{3F135061-2F74-46D4-9F8F-C77EF304855D}" type="datetimeFigureOut">
               <a:rPr lang="en-US" smtClean="0"/>
-              <a:t>9/21/2022</a:t>
+              <a:t>9/26/2022</a:t>
             </a:fld>
             <a:endParaRPr lang="en-US"/>
           </a:p>
@@ -918,7 +918,7 @@
           <a:p>
             <a:fld id="{3F135061-2F74-46D4-9F8F-C77EF304855D}" type="datetimeFigureOut">
               <a:rPr lang="en-US" smtClean="0"/>
-              <a:t>9/21/2022</a:t>
+              <a:t>9/26/2022</a:t>
             </a:fld>
             <a:endParaRPr lang="en-US"/>
           </a:p>
@@ -1098,7 +1098,7 @@
           <a:p>
             <a:fld id="{3F135061-2F74-46D4-9F8F-C77EF304855D}" type="datetimeFigureOut">
               <a:rPr lang="en-US" smtClean="0"/>
-              <a:t>9/21/2022</a:t>
+              <a:t>9/26/2022</a:t>
             </a:fld>
             <a:endParaRPr lang="en-US"/>
           </a:p>
@@ -1268,7 +1268,7 @@
           <a:p>
             <a:fld id="{3F135061-2F74-46D4-9F8F-C77EF304855D}" type="datetimeFigureOut">
               <a:rPr lang="en-US" smtClean="0"/>
-              <a:t>9/21/2022</a:t>
+              <a:t>9/26/2022</a:t>
             </a:fld>
             <a:endParaRPr lang="en-US"/>
           </a:p>
@@ -1512,7 +1512,7 @@
           <a:p>
             <a:fld id="{3F135061-2F74-46D4-9F8F-C77EF304855D}" type="datetimeFigureOut">
               <a:rPr lang="en-US" smtClean="0"/>
-              <a:t>9/21/2022</a:t>
+              <a:t>9/26/2022</a:t>
             </a:fld>
             <a:endParaRPr lang="en-US"/>
           </a:p>
@@ -1744,7 +1744,7 @@
           <a:p>
             <a:fld id="{3F135061-2F74-46D4-9F8F-C77EF304855D}" type="datetimeFigureOut">
               <a:rPr lang="en-US" smtClean="0"/>
-              <a:t>9/21/2022</a:t>
+              <a:t>9/26/2022</a:t>
             </a:fld>
             <a:endParaRPr lang="en-US"/>
           </a:p>
@@ -2111,7 +2111,7 @@
           <a:p>
             <a:fld id="{3F135061-2F74-46D4-9F8F-C77EF304855D}" type="datetimeFigureOut">
               <a:rPr lang="en-US" smtClean="0"/>
-              <a:t>9/21/2022</a:t>
+              <a:t>9/26/2022</a:t>
             </a:fld>
             <a:endParaRPr lang="en-US"/>
           </a:p>
@@ -2229,7 +2229,7 @@
           <a:p>
             <a:fld id="{3F135061-2F74-46D4-9F8F-C77EF304855D}" type="datetimeFigureOut">
               <a:rPr lang="en-US" smtClean="0"/>
-              <a:t>9/21/2022</a:t>
+              <a:t>9/26/2022</a:t>
             </a:fld>
             <a:endParaRPr lang="en-US"/>
           </a:p>
@@ -2324,7 +2324,7 @@
           <a:p>
             <a:fld id="{3F135061-2F74-46D4-9F8F-C77EF304855D}" type="datetimeFigureOut">
               <a:rPr lang="en-US" smtClean="0"/>
-              <a:t>9/21/2022</a:t>
+              <a:t>9/26/2022</a:t>
             </a:fld>
             <a:endParaRPr lang="en-US"/>
           </a:p>
@@ -2601,7 +2601,7 @@
           <a:p>
             <a:fld id="{3F135061-2F74-46D4-9F8F-C77EF304855D}" type="datetimeFigureOut">
               <a:rPr lang="en-US" smtClean="0"/>
-              <a:t>9/21/2022</a:t>
+              <a:t>9/26/2022</a:t>
             </a:fld>
             <a:endParaRPr lang="en-US"/>
           </a:p>
@@ -2858,7 +2858,7 @@
           <a:p>
             <a:fld id="{3F135061-2F74-46D4-9F8F-C77EF304855D}" type="datetimeFigureOut">
               <a:rPr lang="en-US" smtClean="0"/>
-              <a:t>9/21/2022</a:t>
+              <a:t>9/26/2022</a:t>
             </a:fld>
             <a:endParaRPr lang="en-US"/>
           </a:p>
@@ -3071,7 +3071,7 @@
           <a:p>
             <a:fld id="{3F135061-2F74-46D4-9F8F-C77EF304855D}" type="datetimeFigureOut">
               <a:rPr lang="en-US" smtClean="0"/>
-              <a:t>9/21/2022</a:t>
+              <a:t>9/26/2022</a:t>
             </a:fld>
             <a:endParaRPr lang="en-US"/>
           </a:p>
@@ -4699,7 +4699,7 @@
                 </a:solidFill>
                 <a:latin typeface="Lato Black" panose="020F0A02020204030203"/>
               </a:rPr>
-              <a:t>https://bndr.it/54sde</a:t>
+              <a:t>https://bndr.it/nwjmb</a:t>
             </a:r>
           </a:p>
         </p:txBody>

</xml_diff>

<commit_message>
updated all binder urls
</commit_message>
<xml_diff>
--- a/Tankersley_INSTANT_2022_1min_intro.pptx
+++ b/Tankersley_INSTANT_2022_1min_intro.pptx
@@ -4691,7 +4691,7 @@
           </a:p>
           <a:p>
             <a:r>
-              <a:rPr lang="en-NZ" sz="3200" dirty="0">
+              <a:rPr lang="en-NZ" sz="3200">
                 <a:solidFill>
                   <a:schemeClr val="accent1">
                     <a:lumMod val="75000"/>
@@ -4699,8 +4699,16 @@
                 </a:solidFill>
                 <a:latin typeface="Lato Black" panose="020F0A02020204030203"/>
               </a:rPr>
-              <a:t>https://bndr.it/nwjmb</a:t>
-            </a:r>
+              <a:t>https://bndr.it/b5dn7</a:t>
+            </a:r>
+            <a:endParaRPr lang="en-NZ" sz="3200" dirty="0">
+              <a:solidFill>
+                <a:schemeClr val="accent1">
+                  <a:lumMod val="75000"/>
+                </a:schemeClr>
+              </a:solidFill>
+              <a:latin typeface="Lato Black" panose="020F0A02020204030203"/>
+            </a:endParaRPr>
           </a:p>
         </p:txBody>
       </p:sp>

</xml_diff>

<commit_message>
adding the notes from the conference
</commit_message>
<xml_diff>
--- a/Tankersley_INSTANT_2022_1min_intro.pptx
+++ b/Tankersley_INSTANT_2022_1min_intro.pptx
@@ -197,7 +197,7 @@
           <a:p>
             <a:fld id="{994930AC-0CAE-454E-82AE-CCEF7F275F04}" type="datetimeFigureOut">
               <a:rPr lang="en-NZ" smtClean="0"/>
-              <a:t>26/09/2022</a:t>
+              <a:t>30/09/2022</a:t>
             </a:fld>
             <a:endParaRPr lang="en-NZ"/>
           </a:p>
@@ -748,7 +748,7 @@
           <a:p>
             <a:fld id="{3F135061-2F74-46D4-9F8F-C77EF304855D}" type="datetimeFigureOut">
               <a:rPr lang="en-US" smtClean="0"/>
-              <a:t>9/26/2022</a:t>
+              <a:t>9/30/2022</a:t>
             </a:fld>
             <a:endParaRPr lang="en-US"/>
           </a:p>
@@ -918,7 +918,7 @@
           <a:p>
             <a:fld id="{3F135061-2F74-46D4-9F8F-C77EF304855D}" type="datetimeFigureOut">
               <a:rPr lang="en-US" smtClean="0"/>
-              <a:t>9/26/2022</a:t>
+              <a:t>9/30/2022</a:t>
             </a:fld>
             <a:endParaRPr lang="en-US"/>
           </a:p>
@@ -1098,7 +1098,7 @@
           <a:p>
             <a:fld id="{3F135061-2F74-46D4-9F8F-C77EF304855D}" type="datetimeFigureOut">
               <a:rPr lang="en-US" smtClean="0"/>
-              <a:t>9/26/2022</a:t>
+              <a:t>9/30/2022</a:t>
             </a:fld>
             <a:endParaRPr lang="en-US"/>
           </a:p>
@@ -1268,7 +1268,7 @@
           <a:p>
             <a:fld id="{3F135061-2F74-46D4-9F8F-C77EF304855D}" type="datetimeFigureOut">
               <a:rPr lang="en-US" smtClean="0"/>
-              <a:t>9/26/2022</a:t>
+              <a:t>9/30/2022</a:t>
             </a:fld>
             <a:endParaRPr lang="en-US"/>
           </a:p>
@@ -1512,7 +1512,7 @@
           <a:p>
             <a:fld id="{3F135061-2F74-46D4-9F8F-C77EF304855D}" type="datetimeFigureOut">
               <a:rPr lang="en-US" smtClean="0"/>
-              <a:t>9/26/2022</a:t>
+              <a:t>9/30/2022</a:t>
             </a:fld>
             <a:endParaRPr lang="en-US"/>
           </a:p>
@@ -1744,7 +1744,7 @@
           <a:p>
             <a:fld id="{3F135061-2F74-46D4-9F8F-C77EF304855D}" type="datetimeFigureOut">
               <a:rPr lang="en-US" smtClean="0"/>
-              <a:t>9/26/2022</a:t>
+              <a:t>9/30/2022</a:t>
             </a:fld>
             <a:endParaRPr lang="en-US"/>
           </a:p>
@@ -2111,7 +2111,7 @@
           <a:p>
             <a:fld id="{3F135061-2F74-46D4-9F8F-C77EF304855D}" type="datetimeFigureOut">
               <a:rPr lang="en-US" smtClean="0"/>
-              <a:t>9/26/2022</a:t>
+              <a:t>9/30/2022</a:t>
             </a:fld>
             <a:endParaRPr lang="en-US"/>
           </a:p>
@@ -2229,7 +2229,7 @@
           <a:p>
             <a:fld id="{3F135061-2F74-46D4-9F8F-C77EF304855D}" type="datetimeFigureOut">
               <a:rPr lang="en-US" smtClean="0"/>
-              <a:t>9/26/2022</a:t>
+              <a:t>9/30/2022</a:t>
             </a:fld>
             <a:endParaRPr lang="en-US"/>
           </a:p>
@@ -2324,7 +2324,7 @@
           <a:p>
             <a:fld id="{3F135061-2F74-46D4-9F8F-C77EF304855D}" type="datetimeFigureOut">
               <a:rPr lang="en-US" smtClean="0"/>
-              <a:t>9/26/2022</a:t>
+              <a:t>9/30/2022</a:t>
             </a:fld>
             <a:endParaRPr lang="en-US"/>
           </a:p>
@@ -2601,7 +2601,7 @@
           <a:p>
             <a:fld id="{3F135061-2F74-46D4-9F8F-C77EF304855D}" type="datetimeFigureOut">
               <a:rPr lang="en-US" smtClean="0"/>
-              <a:t>9/26/2022</a:t>
+              <a:t>9/30/2022</a:t>
             </a:fld>
             <a:endParaRPr lang="en-US"/>
           </a:p>
@@ -2858,7 +2858,7 @@
           <a:p>
             <a:fld id="{3F135061-2F74-46D4-9F8F-C77EF304855D}" type="datetimeFigureOut">
               <a:rPr lang="en-US" smtClean="0"/>
-              <a:t>9/26/2022</a:t>
+              <a:t>9/30/2022</a:t>
             </a:fld>
             <a:endParaRPr lang="en-US"/>
           </a:p>
@@ -3071,7 +3071,7 @@
           <a:p>
             <a:fld id="{3F135061-2F74-46D4-9F8F-C77EF304855D}" type="datetimeFigureOut">
               <a:rPr lang="en-US" smtClean="0"/>
-              <a:t>9/26/2022</a:t>
+              <a:t>9/30/2022</a:t>
             </a:fld>
             <a:endParaRPr lang="en-US"/>
           </a:p>
@@ -3631,7 +3631,7 @@
         </p:blipFill>
         <p:spPr>
           <a:xfrm>
-            <a:off x="9521175" y="24558513"/>
+            <a:off x="8468292" y="24285683"/>
             <a:ext cx="6843160" cy="2311418"/>
           </a:xfrm>
           <a:prstGeom prst="rect">
@@ -3691,7 +3691,7 @@
         </p:blipFill>
         <p:spPr>
           <a:xfrm>
-            <a:off x="21204858" y="24432809"/>
+            <a:off x="3385978" y="24316857"/>
             <a:ext cx="4211532" cy="2280244"/>
           </a:xfrm>
           <a:prstGeom prst="rect">
@@ -4650,7 +4650,7 @@
         </p:nvSpPr>
         <p:spPr>
           <a:xfrm>
-            <a:off x="27228017" y="24199004"/>
+            <a:off x="26225336" y="24316857"/>
             <a:ext cx="5643485" cy="1692771"/>
           </a:xfrm>
           <a:prstGeom prst="rect">
@@ -4691,7 +4691,7 @@
           </a:p>
           <a:p>
             <a:r>
-              <a:rPr lang="en-NZ" sz="3200">
+              <a:rPr lang="en-NZ" sz="3200" dirty="0">
                 <a:solidFill>
                   <a:schemeClr val="accent1">
                     <a:lumMod val="75000"/>
@@ -4701,14 +4701,6 @@
               </a:rPr>
               <a:t>https://bndr.it/b5dn7</a:t>
             </a:r>
-            <a:endParaRPr lang="en-NZ" sz="3200" dirty="0">
-              <a:solidFill>
-                <a:schemeClr val="accent1">
-                  <a:lumMod val="75000"/>
-                </a:schemeClr>
-              </a:solidFill>
-              <a:latin typeface="Lato Black" panose="020F0A02020204030203"/>
-            </a:endParaRPr>
           </a:p>
         </p:txBody>
       </p:sp>
@@ -4742,8 +4734,8 @@
         </p:blipFill>
         <p:spPr>
           <a:xfrm>
-            <a:off x="32677768" y="23526948"/>
-            <a:ext cx="3272591" cy="3272591"/>
+            <a:off x="31738828" y="22588008"/>
+            <a:ext cx="4211531" cy="4211531"/>
           </a:xfrm>
           <a:prstGeom prst="rect">
             <a:avLst/>

</xml_diff>